<commit_message>
M0078DDG-285 fixed typo in diagram + source pptx
</commit_message>
<xml_diff>
--- a/PlatformDeveloperGuide/images/process-overview5.pptx
+++ b/PlatformDeveloperGuide/images/process-overview5.pptx
@@ -261,7 +261,7 @@
           <a:p>
             <a:fld id="{8382ADF2-3FF2-4FB4-8A07-AE359359CF4F}" type="datetimeFigureOut">
               <a:rPr lang="en-GB" smtClean="0"/>
-              <a:t>01/04/2020</a:t>
+              <a:t>02/06/2020</a:t>
             </a:fld>
             <a:endParaRPr lang="en-GB"/>
           </a:p>
@@ -461,7 +461,7 @@
           <a:p>
             <a:fld id="{8382ADF2-3FF2-4FB4-8A07-AE359359CF4F}" type="datetimeFigureOut">
               <a:rPr lang="en-GB" smtClean="0"/>
-              <a:t>01/04/2020</a:t>
+              <a:t>02/06/2020</a:t>
             </a:fld>
             <a:endParaRPr lang="en-GB"/>
           </a:p>
@@ -671,7 +671,7 @@
           <a:p>
             <a:fld id="{8382ADF2-3FF2-4FB4-8A07-AE359359CF4F}" type="datetimeFigureOut">
               <a:rPr lang="en-GB" smtClean="0"/>
-              <a:t>01/04/2020</a:t>
+              <a:t>02/06/2020</a:t>
             </a:fld>
             <a:endParaRPr lang="en-GB"/>
           </a:p>
@@ -871,7 +871,7 @@
           <a:p>
             <a:fld id="{8382ADF2-3FF2-4FB4-8A07-AE359359CF4F}" type="datetimeFigureOut">
               <a:rPr lang="en-GB" smtClean="0"/>
-              <a:t>01/04/2020</a:t>
+              <a:t>02/06/2020</a:t>
             </a:fld>
             <a:endParaRPr lang="en-GB"/>
           </a:p>
@@ -1147,7 +1147,7 @@
           <a:p>
             <a:fld id="{8382ADF2-3FF2-4FB4-8A07-AE359359CF4F}" type="datetimeFigureOut">
               <a:rPr lang="en-GB" smtClean="0"/>
-              <a:t>01/04/2020</a:t>
+              <a:t>02/06/2020</a:t>
             </a:fld>
             <a:endParaRPr lang="en-GB"/>
           </a:p>
@@ -1415,7 +1415,7 @@
           <a:p>
             <a:fld id="{8382ADF2-3FF2-4FB4-8A07-AE359359CF4F}" type="datetimeFigureOut">
               <a:rPr lang="en-GB" smtClean="0"/>
-              <a:t>01/04/2020</a:t>
+              <a:t>02/06/2020</a:t>
             </a:fld>
             <a:endParaRPr lang="en-GB"/>
           </a:p>
@@ -1830,7 +1830,7 @@
           <a:p>
             <a:fld id="{8382ADF2-3FF2-4FB4-8A07-AE359359CF4F}" type="datetimeFigureOut">
               <a:rPr lang="en-GB" smtClean="0"/>
-              <a:t>01/04/2020</a:t>
+              <a:t>02/06/2020</a:t>
             </a:fld>
             <a:endParaRPr lang="en-GB"/>
           </a:p>
@@ -1972,7 +1972,7 @@
           <a:p>
             <a:fld id="{8382ADF2-3FF2-4FB4-8A07-AE359359CF4F}" type="datetimeFigureOut">
               <a:rPr lang="en-GB" smtClean="0"/>
-              <a:t>01/04/2020</a:t>
+              <a:t>02/06/2020</a:t>
             </a:fld>
             <a:endParaRPr lang="en-GB"/>
           </a:p>
@@ -2085,7 +2085,7 @@
           <a:p>
             <a:fld id="{8382ADF2-3FF2-4FB4-8A07-AE359359CF4F}" type="datetimeFigureOut">
               <a:rPr lang="en-GB" smtClean="0"/>
-              <a:t>01/04/2020</a:t>
+              <a:t>02/06/2020</a:t>
             </a:fld>
             <a:endParaRPr lang="en-GB"/>
           </a:p>
@@ -2398,7 +2398,7 @@
           <a:p>
             <a:fld id="{8382ADF2-3FF2-4FB4-8A07-AE359359CF4F}" type="datetimeFigureOut">
               <a:rPr lang="en-GB" smtClean="0"/>
-              <a:t>01/04/2020</a:t>
+              <a:t>02/06/2020</a:t>
             </a:fld>
             <a:endParaRPr lang="en-GB"/>
           </a:p>
@@ -2687,7 +2687,7 @@
           <a:p>
             <a:fld id="{8382ADF2-3FF2-4FB4-8A07-AE359359CF4F}" type="datetimeFigureOut">
               <a:rPr lang="en-GB" smtClean="0"/>
-              <a:t>01/04/2020</a:t>
+              <a:t>02/06/2020</a:t>
             </a:fld>
             <a:endParaRPr lang="en-GB"/>
           </a:p>
@@ -2930,7 +2930,7 @@
           <a:p>
             <a:fld id="{8382ADF2-3FF2-4FB4-8A07-AE359359CF4F}" type="datetimeFigureOut">
               <a:rPr lang="en-GB" smtClean="0"/>
-              <a:t>01/04/2020</a:t>
+              <a:t>02/06/2020</a:t>
             </a:fld>
             <a:endParaRPr lang="en-GB"/>
           </a:p>
@@ -4337,6 +4337,23 @@
               <a:t>MicroEJ</a:t>
             </a:r>
             <a:r>
+              <a:rPr kumimoji="0" lang="en-US" sz="1100" b="0" u="none" strike="noStrike" kern="0" cap="none" spc="0" normalizeH="0" baseline="0" noProof="0">
+                <a:ln>
+                  <a:noFill/>
+                </a:ln>
+                <a:solidFill>
+                  <a:srgbClr val="4B5357"/>
+                </a:solidFill>
+                <a:effectLst/>
+                <a:uLnTx/>
+                <a:uFillTx/>
+                <a:latin typeface="Source Sans Pro Light" charset="0"/>
+                <a:ea typeface="Source Sans Pro Light" charset="0"/>
+                <a:cs typeface="Source Sans Pro Light" charset="0"/>
+              </a:rPr>
+              <a:t> Platform </a:t>
+            </a:r>
+            <a:r>
               <a:rPr kumimoji="0" lang="en-US" sz="1100" b="0" u="none" strike="noStrike" kern="0" cap="none" spc="0" normalizeH="0" baseline="0" noProof="0" dirty="0">
                 <a:ln>
                   <a:noFill/>
@@ -4351,41 +4368,7 @@
                 <a:ea typeface="Source Sans Pro Light" charset="0"/>
                 <a:cs typeface="Source Sans Pro Light" charset="0"/>
               </a:rPr>
-              <a:t> </a:t>
-            </a:r>
-            <a:r>
-              <a:rPr kumimoji="0" lang="en-US" sz="1100" b="0" u="none" strike="noStrike" kern="0" cap="none" spc="0" normalizeH="0" baseline="0" noProof="0" dirty="0" err="1">
-                <a:ln>
-                  <a:noFill/>
-                </a:ln>
-                <a:solidFill>
-                  <a:srgbClr val="4B5357"/>
-                </a:solidFill>
-                <a:effectLst/>
-                <a:uLnTx/>
-                <a:uFillTx/>
-                <a:latin typeface="Source Sans Pro Light" charset="0"/>
-                <a:ea typeface="Source Sans Pro Light" charset="0"/>
-                <a:cs typeface="Source Sans Pro Light" charset="0"/>
-              </a:rPr>
-              <a:t>Platfrom</a:t>
-            </a:r>
-            <a:r>
-              <a:rPr kumimoji="0" lang="en-US" sz="1100" b="0" u="none" strike="noStrike" kern="0" cap="none" spc="0" normalizeH="0" baseline="0" noProof="0" dirty="0">
-                <a:ln>
-                  <a:noFill/>
-                </a:ln>
-                <a:solidFill>
-                  <a:srgbClr val="4B5357"/>
-                </a:solidFill>
-                <a:effectLst/>
-                <a:uLnTx/>
-                <a:uFillTx/>
-                <a:latin typeface="Source Sans Pro Light" charset="0"/>
-                <a:ea typeface="Source Sans Pro Light" charset="0"/>
-                <a:cs typeface="Source Sans Pro Light" charset="0"/>
-              </a:rPr>
-              <a:t> configuration project</a:t>
+              <a:t>configuration project</a:t>
             </a:r>
           </a:p>
         </p:txBody>

</xml_diff>